<commit_message>
:memo: Add color palette to the presentation
</commit_message>
<xml_diff>
--- a/presentation.pptx
+++ b/presentation.pptx
@@ -105,6 +105,11 @@
       </a:defRPr>
     </a:lvl9pPr>
   </p:defaultTextStyle>
+  <p:extLst>
+    <p:ext uri="{EFAFB233-063F-42B5-8137-9DF3F51BA10A}">
+      <p15:sldGuideLst xmlns:p15="http://schemas.microsoft.com/office/powerpoint/2012/main"/>
+    </p:ext>
+  </p:extLst>
 </p:presentation>
 </file>
 
@@ -3512,6 +3517,36 @@
           </a:p>
         </p:txBody>
       </p:sp>
+      <p:pic>
+        <p:nvPicPr>
+          <p:cNvPr id="4" name="Picture 3">
+            <a:extLst>
+              <a:ext uri="{FF2B5EF4-FFF2-40B4-BE49-F238E27FC236}">
+                <a16:creationId xmlns:a16="http://schemas.microsoft.com/office/drawing/2014/main" id="{BCC233C0-B3DE-3441-ACF8-7C446DE4C82E}"/>
+              </a:ext>
+            </a:extLst>
+          </p:cNvPr>
+          <p:cNvPicPr>
+            <a:picLocks noChangeAspect="1"/>
+          </p:cNvPicPr>
+          <p:nvPr/>
+        </p:nvPicPr>
+        <p:blipFill>
+          <a:blip r:embed="rId2"/>
+          <a:stretch>
+            <a:fillRect/>
+          </a:stretch>
+        </p:blipFill>
+        <p:spPr>
+          <a:xfrm>
+            <a:off x="-18661" y="-11663"/>
+            <a:ext cx="12200709" cy="7625443"/>
+          </a:xfrm>
+          <a:prstGeom prst="rect">
+            <a:avLst/>
+          </a:prstGeom>
+        </p:spPr>
+      </p:pic>
     </p:spTree>
     <p:extLst>
       <p:ext uri="{BB962C8B-B14F-4D97-AF65-F5344CB8AC3E}">

</xml_diff>